<commit_message>
fixed number error in presentation
</commit_message>
<xml_diff>
--- a/documentation/presentation/Project Onslaught.pptx
+++ b/documentation/presentation/Project Onslaught.pptx
@@ -7289,8 +7289,12 @@
               <a:t>yli</a:t>
             </a:r>
             <a:r>
-              <a:rPr lang="en-US" dirty="0"/>
-              <a:t> 7000 </a:t>
+              <a:rPr lang="en-US"/>
+              <a:t> </a:t>
+            </a:r>
+            <a:r>
+              <a:rPr lang="en-US" smtClean="0"/>
+              <a:t>6000 </a:t>
             </a:r>
             <a:r>
               <a:rPr lang="en-US" dirty="0" err="1"/>

</xml_diff>